<commit_message>
Modify Image segmentation with CNN
</commit_message>
<xml_diff>
--- a/Image Segmentation with CNN.pptx
+++ b/Image Segmentation with CNN.pptx
@@ -25,7 +25,8 @@
     <p:sldId id="277" r:id="rId19"/>
     <p:sldId id="279" r:id="rId20"/>
     <p:sldId id="280" r:id="rId21"/>
-    <p:sldId id="281" r:id="rId22"/>
+    <p:sldId id="282" r:id="rId22"/>
+    <p:sldId id="281" r:id="rId23"/>
   </p:sldIdLst>
   <p:sldSz cx="12192000" cy="6858000"/>
   <p:notesSz cx="6858000" cy="9144000"/>
@@ -4785,7 +4786,7 @@
             </a:pPr>
             <a:r>
               <a:rPr lang="en-US" sz="2000" dirty="0"/>
-              <a:t>In this paper, with a 3×3 regular grid depicting relative positions, the author produces a set of 9 score maps. In every map, every pixel is a classifier of relative positions to an object instance. For example, every pixel in the left-top score map stands for its confidence to being left-top part of an instance.</a:t>
+              <a:t>In this paper, with a k*k(3×3) regular grid depicting relative positions, the author produces a set of 9 score maps. In every map, every pixel is a classifier of relative positions to an object instance. For example, every pixel in the left-top score map stands for its confidence to being left-top part of an instance.</a:t>
             </a:r>
           </a:p>
         </p:txBody>
@@ -4906,7 +4907,7 @@
             </a:pPr>
             <a:r>
               <a:rPr lang="en-US" sz="2000" dirty="0"/>
-              <a:t>With the 3*3 output score maps, it’s easy to assemble a score map for a whole instance. For a proposal(extracted by RPN, Region Proposal Network), we can get its left-top part from the left-top score map, and middle part from the middle score map …  So the final score map stands for whether every pixel being inside of instance in the window. Note that we can get a whole score map at arbitrary size.</a:t>
+              <a:t>With the k*k(3*3) output score maps, it’s easy to assemble a score map for a whole instance. For a proposal(extracted by RPN, Region Proposal Network), we can get its left-top part from the left-top score map, and middle part from the middle score map …  So the final score map stands for whether every pixel being inside of instance in the window. Note that we can get a whole score map at arbitrary size.</a:t>
             </a:r>
           </a:p>
         </p:txBody>
@@ -5429,7 +5430,7 @@
               <a:buNone/>
             </a:pPr>
             <a:r>
-              <a:rPr lang="en-US" sz="2000" dirty="0"/>
+              <a:rPr lang="en-US" sz="1800" dirty="0"/>
               <a:t>Remember that in instance-sensitive-FCN:</a:t>
             </a:r>
           </a:p>
@@ -5438,11 +5439,11 @@
               <a:buAutoNum type="arabicPeriod"/>
             </a:pPr>
             <a:r>
-              <a:rPr lang="en-US" sz="2000" dirty="0"/>
+              <a:rPr lang="en-US" sz="1800" dirty="0"/>
               <a:t>Region proposals are extracted by RPN which is not(</a:t>
             </a:r>
             <a:r>
-              <a:rPr lang="en-US" sz="2000" dirty="0">
+              <a:rPr lang="en-US" sz="1800" dirty="0">
                 <a:solidFill>
                   <a:srgbClr val="FF0000"/>
                 </a:solidFill>
@@ -5450,7 +5451,7 @@
               <a:t>I think so</a:t>
             </a:r>
             <a:r>
-              <a:rPr lang="en-US" sz="2000" dirty="0"/>
+              <a:rPr lang="en-US" sz="1800" dirty="0"/>
               <a:t>) integrated in the network. </a:t>
             </a:r>
           </a:p>
@@ -5459,7 +5460,7 @@
               <a:buAutoNum type="arabicPeriod"/>
             </a:pPr>
             <a:r>
-              <a:rPr lang="en-US" sz="2000" dirty="0"/>
+              <a:rPr lang="en-US" sz="1800" dirty="0"/>
               <a:t>The final output is instance segmentation without category information.</a:t>
             </a:r>
           </a:p>
@@ -5467,14 +5468,14 @@
             <a:pPr marL="0" indent="0">
               <a:buNone/>
             </a:pPr>
-            <a:endParaRPr lang="en-US" sz="2000" dirty="0"/>
+            <a:endParaRPr lang="en-US" sz="1800" dirty="0"/>
           </a:p>
           <a:p>
             <a:pPr marL="0" indent="0">
               <a:buNone/>
             </a:pPr>
             <a:r>
-              <a:rPr lang="en-US" sz="2000" dirty="0"/>
+              <a:rPr lang="en-US" sz="1800" dirty="0"/>
               <a:t>Solution:</a:t>
             </a:r>
           </a:p>
@@ -5483,17 +5484,27 @@
               <a:buAutoNum type="arabicPeriod"/>
             </a:pPr>
             <a:r>
-              <a:rPr lang="en-US" sz="2000" dirty="0"/>
+              <a:rPr lang="en-US" sz="1800" dirty="0"/>
               <a:t>Integrate RPN and segmentation network simply by sharing weights in lower conv layers.</a:t>
             </a:r>
           </a:p>
           <a:p>
             <a:pPr marL="457200" indent="-457200">
+              <a:buFont typeface="Arial" panose="020B0604020202020204" pitchFamily="34" charset="0"/>
               <a:buAutoNum type="arabicPeriod"/>
             </a:pPr>
             <a:r>
+              <a:rPr lang="en-US" sz="1800" dirty="0"/>
+              <a:t>Predict category in segmentation network(integration again).  </a:t>
+            </a:r>
+          </a:p>
+          <a:p>
+            <a:pPr marL="0" indent="0">
+              <a:buNone/>
+            </a:pPr>
+            <a:r>
               <a:rPr lang="en-US" sz="2000" dirty="0"/>
-              <a:t>Predict category in segmentation network. Since the same pixel can be foreground on one object but background on another (adjacent) object, </a:t>
+              <a:t>	</a:t>
             </a:r>
           </a:p>
         </p:txBody>
@@ -5533,6 +5544,233 @@
           <p:cNvPr id="2" name="Title 1">
             <a:extLst>
               <a:ext uri="{FF2B5EF4-FFF2-40B4-BE49-F238E27FC236}">
+                <a16:creationId xmlns:a16="http://schemas.microsoft.com/office/drawing/2014/main" id="{336CB378-EBA1-436D-BF58-FC80E06502F0}"/>
+              </a:ext>
+            </a:extLst>
+          </p:cNvPr>
+          <p:cNvSpPr>
+            <a:spLocks noGrp="1"/>
+          </p:cNvSpPr>
+          <p:nvPr>
+            <p:ph type="title"/>
+          </p:nvPr>
+        </p:nvSpPr>
+        <p:spPr/>
+        <p:txBody>
+          <a:bodyPr/>
+          <a:lstStyle/>
+          <a:p>
+            <a:r>
+              <a:rPr lang="en-US" dirty="0"/>
+              <a:t>Predict and segment(figure on the next page)</a:t>
+            </a:r>
+          </a:p>
+        </p:txBody>
+      </p:sp>
+      <p:sp>
+        <p:nvSpPr>
+          <p:cNvPr id="3" name="Content Placeholder 2">
+            <a:extLst>
+              <a:ext uri="{FF2B5EF4-FFF2-40B4-BE49-F238E27FC236}">
+                <a16:creationId xmlns:a16="http://schemas.microsoft.com/office/drawing/2014/main" id="{F639D31D-8FED-48EE-8D1E-C3A063C9C908}"/>
+              </a:ext>
+            </a:extLst>
+          </p:cNvPr>
+          <p:cNvSpPr>
+            <a:spLocks noGrp="1"/>
+          </p:cNvSpPr>
+          <p:nvPr>
+            <p:ph idx="1"/>
+          </p:nvPr>
+        </p:nvSpPr>
+        <p:spPr/>
+        <p:txBody>
+          <a:bodyPr>
+            <a:normAutofit fontScale="92500" lnSpcReduction="20000"/>
+          </a:bodyPr>
+          <a:lstStyle/>
+          <a:p>
+            <a:pPr marL="0" indent="0">
+              <a:buNone/>
+            </a:pPr>
+            <a:r>
+              <a:rPr lang="en-US" sz="1800" dirty="0" err="1"/>
+              <a:t>i</a:t>
+            </a:r>
+            <a:r>
+              <a:rPr lang="en-US" sz="1800" dirty="0"/>
+              <a:t>) Get 2 * #categories * k * k score maps.</a:t>
+            </a:r>
+          </a:p>
+          <a:p>
+            <a:pPr marL="0" indent="0">
+              <a:buNone/>
+            </a:pPr>
+            <a:r>
+              <a:rPr lang="en-US" sz="1800" dirty="0"/>
+              <a:t>	 k * k comes from “Instance-sensitive-FCN”, remember there are k*k relative regions in that network.</a:t>
+            </a:r>
+          </a:p>
+          <a:p>
+            <a:pPr marL="0" indent="0">
+              <a:buNone/>
+            </a:pPr>
+            <a:r>
+              <a:rPr lang="en-US" sz="1800" dirty="0"/>
+              <a:t>       	 #categories comes from that we need score map on every category.</a:t>
+            </a:r>
+          </a:p>
+          <a:p>
+            <a:pPr marL="0" indent="0">
+              <a:buNone/>
+            </a:pPr>
+            <a:r>
+              <a:rPr lang="en-US" sz="1800" dirty="0"/>
+              <a:t>	2 comes from that a pixel being foreground or background on an object since the same pixel can be         	foreground on one object but background on another (adjacent) object.</a:t>
+            </a:r>
+          </a:p>
+          <a:p>
+            <a:pPr marL="0" indent="0">
+              <a:buNone/>
+            </a:pPr>
+            <a:r>
+              <a:rPr lang="en-US" sz="1800" dirty="0"/>
+              <a:t>ii) Assemble 2 * #categories * k * k score maps to 2 * #categories.</a:t>
+            </a:r>
+          </a:p>
+          <a:p>
+            <a:pPr marL="0" indent="0">
+              <a:buNone/>
+            </a:pPr>
+            <a:r>
+              <a:rPr lang="en-US" sz="1800" dirty="0"/>
+              <a:t>	This process is the same as “Instance-sensitive-FCN”.</a:t>
+            </a:r>
+          </a:p>
+          <a:p>
+            <a:pPr marL="0" indent="0">
+              <a:buNone/>
+            </a:pPr>
+            <a:r>
+              <a:rPr lang="en-US" sz="1800" dirty="0"/>
+              <a:t>iii) a. [</a:t>
+            </a:r>
+            <a:r>
+              <a:rPr lang="en-US" altLang="zh-CN" sz="1800" dirty="0"/>
+              <a:t>Classify</a:t>
+            </a:r>
+            <a:r>
+              <a:rPr lang="en-US" sz="1800" dirty="0"/>
+              <a:t>] Classify the instance’s category, note that background is also a category. </a:t>
+            </a:r>
+          </a:p>
+          <a:p>
+            <a:pPr marL="0" indent="0">
+              <a:buNone/>
+            </a:pPr>
+            <a:r>
+              <a:rPr lang="en-US" sz="1800" dirty="0"/>
+              <a:t>	On every two corresponding score maps(stands for a pixel being foreground or background on a specific 	category , 	take max operation). Then we get #category score maps.</a:t>
+            </a:r>
+          </a:p>
+          <a:p>
+            <a:pPr marL="0" indent="0">
+              <a:buNone/>
+            </a:pPr>
+            <a:r>
+              <a:rPr lang="en-US" sz="1800" dirty="0"/>
+              <a:t>	On the #category score maps, calculate average(this is exactly average-pooling), get #category scalars.</a:t>
+            </a:r>
+          </a:p>
+          <a:p>
+            <a:pPr marL="0" indent="0">
+              <a:buNone/>
+            </a:pPr>
+            <a:r>
+              <a:rPr lang="en-US" sz="1800" dirty="0"/>
+              <a:t>	</a:t>
+            </a:r>
+            <a:r>
+              <a:rPr lang="en-US" sz="1800" dirty="0" err="1"/>
+              <a:t>Softmax</a:t>
+            </a:r>
+            <a:r>
+              <a:rPr lang="en-US" sz="1800" dirty="0"/>
+              <a:t> operation on the #category scalars.</a:t>
+            </a:r>
+          </a:p>
+          <a:p>
+            <a:pPr marL="0" indent="0">
+              <a:buNone/>
+            </a:pPr>
+            <a:r>
+              <a:rPr lang="en-US" sz="1800" dirty="0"/>
+              <a:t>     b. [Segment] Get instance’s mask in the proposal.</a:t>
+            </a:r>
+          </a:p>
+          <a:p>
+            <a:pPr marL="0" indent="0">
+              <a:buNone/>
+            </a:pPr>
+            <a:r>
+              <a:rPr lang="en-US" sz="1800" dirty="0"/>
+              <a:t>	On every pixel of every two corresponding score maps, take </a:t>
+            </a:r>
+            <a:r>
+              <a:rPr lang="en-US" sz="1800" dirty="0" err="1"/>
+              <a:t>softmax</a:t>
+            </a:r>
+            <a:r>
+              <a:rPr lang="en-US" sz="1800" dirty="0"/>
+              <a:t> operation, get 	probabilities of a pixel 	being foreground or background.</a:t>
+            </a:r>
+          </a:p>
+          <a:p>
+            <a:pPr marL="0" indent="0">
+              <a:buNone/>
+            </a:pPr>
+            <a:endParaRPr lang="en-US" sz="1800" dirty="0"/>
+          </a:p>
+          <a:p>
+            <a:endParaRPr lang="en-US" dirty="0"/>
+          </a:p>
+        </p:txBody>
+      </p:sp>
+    </p:spTree>
+    <p:extLst>
+      <p:ext uri="{BB962C8B-B14F-4D97-AF65-F5344CB8AC3E}">
+        <p14:creationId xmlns:p14="http://schemas.microsoft.com/office/powerpoint/2010/main" val="2048807363"/>
+      </p:ext>
+    </p:extLst>
+  </p:cSld>
+  <p:clrMapOvr>
+    <a:masterClrMapping/>
+  </p:clrMapOvr>
+</p:sld>
+</file>
+
+<file path=ppt/slides/slide22.xml><?xml version="1.0" encoding="utf-8"?>
+<p:sld xmlns:a="http://schemas.openxmlformats.org/drawingml/2006/main" xmlns:r="http://schemas.openxmlformats.org/officeDocument/2006/relationships" xmlns:p="http://schemas.openxmlformats.org/presentationml/2006/main">
+  <p:cSld>
+    <p:spTree>
+      <p:nvGrpSpPr>
+        <p:cNvPr id="1" name=""/>
+        <p:cNvGrpSpPr/>
+        <p:nvPr/>
+      </p:nvGrpSpPr>
+      <p:grpSpPr>
+        <a:xfrm>
+          <a:off x="0" y="0"/>
+          <a:ext cx="0" cy="0"/>
+          <a:chOff x="0" y="0"/>
+          <a:chExt cx="0" cy="0"/>
+        </a:xfrm>
+      </p:grpSpPr>
+      <p:sp>
+        <p:nvSpPr>
+          <p:cNvPr id="2" name="Title 1">
+            <a:extLst>
+              <a:ext uri="{FF2B5EF4-FFF2-40B4-BE49-F238E27FC236}">
                 <a16:creationId xmlns:a16="http://schemas.microsoft.com/office/drawing/2014/main" id="{94929785-9713-44E4-80B0-F0FCB31C170E}"/>
               </a:ext>
             </a:extLst>
@@ -5544,21 +5782,29 @@
             <p:ph type="title"/>
           </p:nvPr>
         </p:nvSpPr>
-        <p:spPr/>
+        <p:spPr>
+          <a:xfrm>
+            <a:off x="838200" y="365125"/>
+            <a:ext cx="10968250" cy="1325563"/>
+          </a:xfrm>
+        </p:spPr>
         <p:txBody>
           <a:bodyPr/>
           <a:lstStyle/>
           <a:p>
-            <a:endParaRPr lang="en-US"/>
+            <a:r>
+              <a:rPr lang="en-US" dirty="0"/>
+              <a:t>Instance-sensitive Fully Convolutional Networks</a:t>
+            </a:r>
           </a:p>
         </p:txBody>
       </p:sp>
       <p:pic>
         <p:nvPicPr>
-          <p:cNvPr id="4" name="Content Placeholder 3">
-            <a:extLst>
-              <a:ext uri="{FF2B5EF4-FFF2-40B4-BE49-F238E27FC236}">
-                <a16:creationId xmlns:a16="http://schemas.microsoft.com/office/drawing/2014/main" id="{9B4DB3B0-E6FF-433D-BD2A-07A4578A8199}"/>
+          <p:cNvPr id="8" name="Content Placeholder 7" descr="A screenshot of a cell phone&#10;&#10;Description generated with high confidence">
+            <a:extLst>
+              <a:ext uri="{FF2B5EF4-FFF2-40B4-BE49-F238E27FC236}">
+                <a16:creationId xmlns:a16="http://schemas.microsoft.com/office/drawing/2014/main" id="{8915B793-6C02-47A2-A9A2-BC922EFAE599}"/>
               </a:ext>
             </a:extLst>
           </p:cNvPr>
@@ -5570,19 +5816,22 @@
           </p:nvPr>
         </p:nvPicPr>
         <p:blipFill>
-          <a:blip r:embed="rId2"/>
+          <a:blip r:embed="rId2">
+            <a:extLst>
+              <a:ext uri="{28A0092B-C50C-407E-A947-70E740481C1C}">
+                <a14:useLocalDpi xmlns:a14="http://schemas.microsoft.com/office/drawing/2010/main" val="0"/>
+              </a:ext>
+            </a:extLst>
+          </a:blip>
           <a:stretch>
             <a:fillRect/>
           </a:stretch>
         </p:blipFill>
         <p:spPr>
           <a:xfrm>
-            <a:off x="2681287" y="2672556"/>
-            <a:ext cx="6829425" cy="2657475"/>
+            <a:off x="671018" y="1499149"/>
+            <a:ext cx="10682782" cy="4993726"/>
           </a:xfrm>
-          <a:prstGeom prst="rect">
-            <a:avLst/>
-          </a:prstGeom>
         </p:spPr>
       </p:pic>
     </p:spTree>

</xml_diff>

<commit_message>
update Image segmentation with CNN
</commit_message>
<xml_diff>
--- a/Image Segmentation with CNN.pptx
+++ b/Image Segmentation with CNN.pptx
@@ -284,7 +284,7 @@
           <a:p>
             <a:fld id="{727FD472-18D6-48AF-A174-88CF5B72C9D3}" type="datetimeFigureOut">
               <a:rPr lang="en-US" smtClean="0"/>
-              <a:t>11/7/2017</a:t>
+              <a:t>11/15/2017</a:t>
             </a:fld>
             <a:endParaRPr lang="en-US"/>
           </a:p>
@@ -482,7 +482,7 @@
           <a:p>
             <a:fld id="{727FD472-18D6-48AF-A174-88CF5B72C9D3}" type="datetimeFigureOut">
               <a:rPr lang="en-US" smtClean="0"/>
-              <a:t>11/7/2017</a:t>
+              <a:t>11/15/2017</a:t>
             </a:fld>
             <a:endParaRPr lang="en-US"/>
           </a:p>
@@ -690,7 +690,7 @@
           <a:p>
             <a:fld id="{727FD472-18D6-48AF-A174-88CF5B72C9D3}" type="datetimeFigureOut">
               <a:rPr lang="en-US" smtClean="0"/>
-              <a:t>11/7/2017</a:t>
+              <a:t>11/15/2017</a:t>
             </a:fld>
             <a:endParaRPr lang="en-US"/>
           </a:p>
@@ -888,7 +888,7 @@
           <a:p>
             <a:fld id="{727FD472-18D6-48AF-A174-88CF5B72C9D3}" type="datetimeFigureOut">
               <a:rPr lang="en-US" smtClean="0"/>
-              <a:t>11/7/2017</a:t>
+              <a:t>11/15/2017</a:t>
             </a:fld>
             <a:endParaRPr lang="en-US"/>
           </a:p>
@@ -1163,7 +1163,7 @@
           <a:p>
             <a:fld id="{727FD472-18D6-48AF-A174-88CF5B72C9D3}" type="datetimeFigureOut">
               <a:rPr lang="en-US" smtClean="0"/>
-              <a:t>11/7/2017</a:t>
+              <a:t>11/15/2017</a:t>
             </a:fld>
             <a:endParaRPr lang="en-US"/>
           </a:p>
@@ -1428,7 +1428,7 @@
           <a:p>
             <a:fld id="{727FD472-18D6-48AF-A174-88CF5B72C9D3}" type="datetimeFigureOut">
               <a:rPr lang="en-US" smtClean="0"/>
-              <a:t>11/7/2017</a:t>
+              <a:t>11/15/2017</a:t>
             </a:fld>
             <a:endParaRPr lang="en-US"/>
           </a:p>
@@ -1840,7 +1840,7 @@
           <a:p>
             <a:fld id="{727FD472-18D6-48AF-A174-88CF5B72C9D3}" type="datetimeFigureOut">
               <a:rPr lang="en-US" smtClean="0"/>
-              <a:t>11/7/2017</a:t>
+              <a:t>11/15/2017</a:t>
             </a:fld>
             <a:endParaRPr lang="en-US"/>
           </a:p>
@@ -1981,7 +1981,7 @@
           <a:p>
             <a:fld id="{727FD472-18D6-48AF-A174-88CF5B72C9D3}" type="datetimeFigureOut">
               <a:rPr lang="en-US" smtClean="0"/>
-              <a:t>11/7/2017</a:t>
+              <a:t>11/15/2017</a:t>
             </a:fld>
             <a:endParaRPr lang="en-US"/>
           </a:p>
@@ -2094,7 +2094,7 @@
           <a:p>
             <a:fld id="{727FD472-18D6-48AF-A174-88CF5B72C9D3}" type="datetimeFigureOut">
               <a:rPr lang="en-US" smtClean="0"/>
-              <a:t>11/7/2017</a:t>
+              <a:t>11/15/2017</a:t>
             </a:fld>
             <a:endParaRPr lang="en-US"/>
           </a:p>
@@ -2405,7 +2405,7 @@
           <a:p>
             <a:fld id="{727FD472-18D6-48AF-A174-88CF5B72C9D3}" type="datetimeFigureOut">
               <a:rPr lang="en-US" smtClean="0"/>
-              <a:t>11/7/2017</a:t>
+              <a:t>11/15/2017</a:t>
             </a:fld>
             <a:endParaRPr lang="en-US"/>
           </a:p>
@@ -2693,7 +2693,7 @@
           <a:p>
             <a:fld id="{727FD472-18D6-48AF-A174-88CF5B72C9D3}" type="datetimeFigureOut">
               <a:rPr lang="en-US" smtClean="0"/>
-              <a:t>11/7/2017</a:t>
+              <a:t>11/15/2017</a:t>
             </a:fld>
             <a:endParaRPr lang="en-US"/>
           </a:p>
@@ -2934,7 +2934,7 @@
           <a:p>
             <a:fld id="{727FD472-18D6-48AF-A174-88CF5B72C9D3}" type="datetimeFigureOut">
               <a:rPr lang="en-US" smtClean="0"/>
-              <a:t>11/7/2017</a:t>
+              <a:t>11/15/2017</a:t>
             </a:fld>
             <a:endParaRPr lang="en-US"/>
           </a:p>
@@ -5303,7 +5303,19 @@
               <a:rPr lang="en-US" dirty="0">
                 <a:latin typeface="+mj-lt"/>
               </a:rPr>
-              <a:t> Convolution, and Fully Connected CRFs</a:t>
+              <a:t> Convolution, and Fully Connected CRFs(</a:t>
+            </a:r>
+            <a:r>
+              <a:rPr lang="en-US" dirty="0" err="1">
+                <a:latin typeface="+mj-lt"/>
+              </a:rPr>
+              <a:t>ing</a:t>
+            </a:r>
+            <a:r>
+              <a:rPr lang="en-US" dirty="0">
+                <a:latin typeface="+mj-lt"/>
+              </a:rPr>
+              <a:t>…)</a:t>
             </a:r>
           </a:p>
           <a:p>
@@ -5319,29 +5331,8 @@
               <a:rPr lang="en-US" dirty="0">
                 <a:latin typeface="+mj-lt"/>
               </a:rPr>
-              <a:t>Fully Convolutional Instance-aware Semantic Segmentation(</a:t>
-            </a:r>
-            <a:r>
-              <a:rPr lang="en-US" dirty="0" err="1">
-                <a:latin typeface="+mj-lt"/>
-              </a:rPr>
-              <a:t>ing</a:t>
-            </a:r>
-            <a:r>
-              <a:rPr lang="en-US" altLang="zh-CN">
-                <a:latin typeface="+mj-lt"/>
-              </a:rPr>
-              <a:t>···</a:t>
-            </a:r>
-            <a:r>
-              <a:rPr lang="en-US">
-                <a:latin typeface="+mj-lt"/>
-              </a:rPr>
-              <a:t>)</a:t>
-            </a:r>
-            <a:endParaRPr lang="en-US" dirty="0">
-              <a:latin typeface="+mj-lt"/>
-            </a:endParaRPr>
+              <a:t>Fully Convolutional Instance-aware Semantic Segmentation</a:t>
+            </a:r>
           </a:p>
         </p:txBody>
       </p:sp>

</xml_diff>